<commit_message>
added project 2 docs!
</commit_message>
<xml_diff>
--- a/project_02/Docs/Enriquez_ENGI301_project_02.pptx
+++ b/project_02/Docs/Enriquez_ENGI301_project_02.pptx
@@ -217,7 +217,7 @@
           <a:p>
             <a:fld id="{59041DB8-B66F-4DC8-A96E-33677E0F90FF}" type="datetimeFigureOut">
               <a:rPr lang="en-US" smtClean="0"/>
-              <a:t>12/14/2024</a:t>
+              <a:t>12/16/2024</a:t>
             </a:fld>
             <a:endParaRPr lang="en-US"/>
           </a:p>
@@ -382,7 +382,7 @@
           <a:p>
             <a:fld id="{DEB49C4A-65AC-492D-9701-81B46C3AD0E4}" type="datetimeFigureOut">
               <a:rPr lang="en-US" smtClean="0"/>
-              <a:t>12/14/2024</a:t>
+              <a:t>12/15/2024</a:t>
             </a:fld>
             <a:endParaRPr lang="en-US"/>
           </a:p>
@@ -2790,7 +2790,7 @@
           <a:p>
             <a:fld id="{384A29A4-78C8-47AB-BA06-22CB45938951}" type="datetime1">
               <a:rPr lang="en-US" smtClean="0"/>
-              <a:t>12/14/2024</a:t>
+              <a:t>12/15/2024</a:t>
             </a:fld>
             <a:endParaRPr lang="en-US"/>
           </a:p>
@@ -2985,7 +2985,7 @@
           <a:p>
             <a:fld id="{E1ED4ACF-2D82-46F2-A8E9-23963AA34E86}" type="datetime1">
               <a:rPr lang="en-US" smtClean="0"/>
-              <a:t>12/14/2024</a:t>
+              <a:t>12/15/2024</a:t>
             </a:fld>
             <a:endParaRPr lang="en-US"/>
           </a:p>
@@ -3179,7 +3179,7 @@
           <a:p>
             <a:fld id="{AE374B5B-21A0-4192-BF4C-38187F1A68D8}" type="datetime1">
               <a:rPr lang="en-US" smtClean="0"/>
-              <a:t>12/14/2024</a:t>
+              <a:t>12/15/2024</a:t>
             </a:fld>
             <a:endParaRPr lang="en-US"/>
           </a:p>
@@ -5520,7 +5520,7 @@
           <a:p>
             <a:fld id="{33B5CF7C-B333-48E1-A4A6-83A3C8B73AC0}" type="datetime1">
               <a:rPr lang="en-US" smtClean="0"/>
-              <a:t>12/14/2024</a:t>
+              <a:t>12/15/2024</a:t>
             </a:fld>
             <a:endParaRPr lang="en-US"/>
           </a:p>
@@ -5973,7 +5973,7 @@
           <a:p>
             <a:fld id="{AE320762-5CBF-4210-AB54-376B091119F8}" type="datetime1">
               <a:rPr lang="en-US" smtClean="0"/>
-              <a:t>12/14/2024</a:t>
+              <a:t>12/15/2024</a:t>
             </a:fld>
             <a:endParaRPr lang="en-US"/>
           </a:p>
@@ -6105,7 +6105,7 @@
           <a:p>
             <a:fld id="{7F0DB371-BF5F-4058-A212-1A908E4D2674}" type="datetime1">
               <a:rPr lang="en-US" smtClean="0"/>
-              <a:t>12/14/2024</a:t>
+              <a:t>12/15/2024</a:t>
             </a:fld>
             <a:endParaRPr lang="en-US"/>
           </a:p>
@@ -8038,7 +8038,7 @@
           <a:p>
             <a:fld id="{60A4083B-90AA-48CF-BAD5-00AA24D7F288}" type="datetime1">
               <a:rPr lang="en-US" smtClean="0"/>
-              <a:t>12/14/2024</a:t>
+              <a:t>12/15/2024</a:t>
             </a:fld>
             <a:endParaRPr lang="en-US"/>
           </a:p>
@@ -10297,7 +10297,7 @@
             <a:fld id="{F5BAF629-ECA2-4CF3-B790-9D9BDED98269}" type="datetime1">
               <a:rPr lang="en-US" smtClean="0"/>
               <a:pPr/>
-              <a:t>12/14/2024</a:t>
+              <a:t>12/15/2024</a:t>
             </a:fld>
             <a:endParaRPr lang="en-US"/>
           </a:p>
@@ -14592,7 +14592,7 @@
             <a:fld id="{B51B2453-8663-4C69-AF73-9FD7B1DEC5D0}" type="datetime1">
               <a:rPr lang="en-US" smtClean="0"/>
               <a:pPr/>
-              <a:t>12/14/2024</a:t>
+              <a:t>12/15/2024</a:t>
             </a:fld>
             <a:endParaRPr lang="en-US" dirty="0"/>
           </a:p>

</xml_diff>